<commit_message>
Initial Notes and Exercises for Lesson 02
</commit_message>
<xml_diff>
--- a/Lesson 01 - Introduction/Lesson 01 – Introduction to Python.pptx
+++ b/Lesson 01 - Introduction/Lesson 01 – Introduction to Python.pptx
@@ -5,7 +5,7 @@
     <p:sldMasterId id="2147483764" r:id="rId1"/>
   </p:sldMasterIdLst>
   <p:notesMasterIdLst>
-    <p:notesMasterId r:id="rId11"/>
+    <p:notesMasterId r:id="rId12"/>
   </p:notesMasterIdLst>
   <p:sldIdLst>
     <p:sldId id="256" r:id="rId2"/>
@@ -17,6 +17,7 @@
     <p:sldId id="264" r:id="rId8"/>
     <p:sldId id="265" r:id="rId9"/>
     <p:sldId id="266" r:id="rId10"/>
+    <p:sldId id="267" r:id="rId11"/>
   </p:sldIdLst>
   <p:sldSz cx="12192000" cy="6858000"/>
   <p:notesSz cx="6858000" cy="9144000"/>
@@ -125,6 +126,61 @@
 
 <file path=ppt/changesInfos/changesInfo1.xml><?xml version="1.0" encoding="utf-8"?>
 <pc:chgInfo xmlns:a="http://schemas.openxmlformats.org/drawingml/2006/main" xmlns:r="http://schemas.openxmlformats.org/officeDocument/2006/relationships" xmlns:ac="http://schemas.microsoft.com/office/drawing/2013/main/command" xmlns:pc="http://schemas.microsoft.com/office/powerpoint/2013/main/command">
+  <pc:docChgLst>
+    <pc:chgData name="Jim Finn" userId="fcf7da85b79b963a" providerId="LiveId" clId="{53DFCDF7-F5C1-428D-9001-F55F1ACC16E5}"/>
+    <pc:docChg chg="custSel addSld modSld">
+      <pc:chgData name="Jim Finn" userId="fcf7da85b79b963a" providerId="LiveId" clId="{53DFCDF7-F5C1-428D-9001-F55F1ACC16E5}" dt="2023-08-08T15:25:47.461" v="477" actId="20577"/>
+      <pc:docMkLst>
+        <pc:docMk/>
+      </pc:docMkLst>
+      <pc:sldChg chg="modSp mod">
+        <pc:chgData name="Jim Finn" userId="fcf7da85b79b963a" providerId="LiveId" clId="{53DFCDF7-F5C1-428D-9001-F55F1ACC16E5}" dt="2023-08-08T15:24:37.648" v="340" actId="20577"/>
+        <pc:sldMkLst>
+          <pc:docMk/>
+          <pc:sldMk cId="3388930595" sldId="266"/>
+        </pc:sldMkLst>
+        <pc:spChg chg="mod">
+          <ac:chgData name="Jim Finn" userId="fcf7da85b79b963a" providerId="LiveId" clId="{53DFCDF7-F5C1-428D-9001-F55F1ACC16E5}" dt="2023-08-08T15:15:40.599" v="28" actId="20577"/>
+          <ac:spMkLst>
+            <pc:docMk/>
+            <pc:sldMk cId="3388930595" sldId="266"/>
+            <ac:spMk id="2" creationId="{8B23A6E2-9EE7-430F-2CC6-A57AD863B834}"/>
+          </ac:spMkLst>
+        </pc:spChg>
+        <pc:spChg chg="mod">
+          <ac:chgData name="Jim Finn" userId="fcf7da85b79b963a" providerId="LiveId" clId="{53DFCDF7-F5C1-428D-9001-F55F1ACC16E5}" dt="2023-08-08T15:24:37.648" v="340" actId="20577"/>
+          <ac:spMkLst>
+            <pc:docMk/>
+            <pc:sldMk cId="3388930595" sldId="266"/>
+            <ac:spMk id="3" creationId="{C170A3B0-48D1-7D1A-ED7E-9330EA75D53C}"/>
+          </ac:spMkLst>
+        </pc:spChg>
+      </pc:sldChg>
+      <pc:sldChg chg="modSp new mod">
+        <pc:chgData name="Jim Finn" userId="fcf7da85b79b963a" providerId="LiveId" clId="{53DFCDF7-F5C1-428D-9001-F55F1ACC16E5}" dt="2023-08-08T15:25:47.461" v="477" actId="20577"/>
+        <pc:sldMkLst>
+          <pc:docMk/>
+          <pc:sldMk cId="1386672185" sldId="267"/>
+        </pc:sldMkLst>
+        <pc:spChg chg="mod">
+          <ac:chgData name="Jim Finn" userId="fcf7da85b79b963a" providerId="LiveId" clId="{53DFCDF7-F5C1-428D-9001-F55F1ACC16E5}" dt="2023-08-08T15:25:07.166" v="348" actId="20577"/>
+          <ac:spMkLst>
+            <pc:docMk/>
+            <pc:sldMk cId="1386672185" sldId="267"/>
+            <ac:spMk id="2" creationId="{3930745E-F976-C7E3-6A12-11E468612180}"/>
+          </ac:spMkLst>
+        </pc:spChg>
+        <pc:spChg chg="mod">
+          <ac:chgData name="Jim Finn" userId="fcf7da85b79b963a" providerId="LiveId" clId="{53DFCDF7-F5C1-428D-9001-F55F1ACC16E5}" dt="2023-08-08T15:25:47.461" v="477" actId="20577"/>
+          <ac:spMkLst>
+            <pc:docMk/>
+            <pc:sldMk cId="1386672185" sldId="267"/>
+            <ac:spMk id="3" creationId="{4D226A41-1D86-96D1-DF1E-1CC5032F2C36}"/>
+          </ac:spMkLst>
+        </pc:spChg>
+      </pc:sldChg>
+    </pc:docChg>
+  </pc:docChgLst>
   <pc:docChgLst>
     <pc:chgData name="Jim Finn" userId="fcf7da85b79b963a" providerId="LiveId" clId="{84759B41-5BA5-4CE9-9744-31FC16BF350B}"/>
     <pc:docChg chg="custSel modSld">
@@ -3093,7 +3149,7 @@
           <a:p>
             <a:fld id="{1D63DF1F-1749-4BA6-89F1-E731035F336C}" type="datetimeFigureOut">
               <a:rPr lang="en-IE" smtClean="0"/>
-              <a:t>04/08/2023</a:t>
+              <a:t>08/08/2023</a:t>
             </a:fld>
             <a:endParaRPr lang="en-IE"/>
           </a:p>
@@ -3546,7 +3602,7 @@
           <a:p>
             <a:fld id="{76969C88-B244-455D-A017-012B25B1ACDD}" type="datetimeFigureOut">
               <a:rPr lang="en-US" smtClean="0"/>
-              <a:t>8/4/2023</a:t>
+              <a:t>8/8/2023</a:t>
             </a:fld>
             <a:endParaRPr lang="en-US"/>
           </a:p>
@@ -3845,7 +3901,7 @@
             <a:fld id="{76969C88-B244-455D-A017-012B25B1ACDD}" type="datetimeFigureOut">
               <a:rPr lang="en-US" smtClean="0"/>
               <a:pPr/>
-              <a:t>8/4/2023</a:t>
+              <a:t>8/8/2023</a:t>
             </a:fld>
             <a:endParaRPr lang="en-US"/>
           </a:p>
@@ -4039,7 +4095,7 @@
             <a:fld id="{76969C88-B244-455D-A017-012B25B1ACDD}" type="datetimeFigureOut">
               <a:rPr lang="en-US" smtClean="0"/>
               <a:pPr/>
-              <a:t>8/4/2023</a:t>
+              <a:t>8/8/2023</a:t>
             </a:fld>
             <a:endParaRPr lang="en-US"/>
           </a:p>
@@ -4302,7 +4358,7 @@
             <a:fld id="{76969C88-B244-455D-A017-012B25B1ACDD}" type="datetimeFigureOut">
               <a:rPr lang="en-US" smtClean="0"/>
               <a:pPr/>
-              <a:t>8/4/2023</a:t>
+              <a:t>8/8/2023</a:t>
             </a:fld>
             <a:endParaRPr lang="en-US"/>
           </a:p>
@@ -4728,7 +4784,7 @@
             <a:fld id="{76969C88-B244-455D-A017-012B25B1ACDD}" type="datetimeFigureOut">
               <a:rPr lang="en-US" smtClean="0"/>
               <a:pPr/>
-              <a:t>8/4/2023</a:t>
+              <a:t>8/8/2023</a:t>
             </a:fld>
             <a:endParaRPr lang="en-US"/>
           </a:p>
@@ -5267,7 +5323,7 @@
             <a:fld id="{76969C88-B244-455D-A017-012B25B1ACDD}" type="datetimeFigureOut">
               <a:rPr lang="en-US" smtClean="0"/>
               <a:pPr/>
-              <a:t>8/4/2023</a:t>
+              <a:t>8/8/2023</a:t>
             </a:fld>
             <a:endParaRPr lang="en-US"/>
           </a:p>
@@ -6133,7 +6189,7 @@
             <a:fld id="{76969C88-B244-455D-A017-012B25B1ACDD}" type="datetimeFigureOut">
               <a:rPr lang="en-US" smtClean="0"/>
               <a:pPr/>
-              <a:t>8/4/2023</a:t>
+              <a:t>8/8/2023</a:t>
             </a:fld>
             <a:endParaRPr lang="en-US"/>
           </a:p>
@@ -6304,7 +6360,7 @@
           <a:p>
             <a:fld id="{76969C88-B244-455D-A017-012B25B1ACDD}" type="datetimeFigureOut">
               <a:rPr lang="en-US" smtClean="0"/>
-              <a:t>8/4/2023</a:t>
+              <a:t>8/8/2023</a:t>
             </a:fld>
             <a:endParaRPr lang="en-US"/>
           </a:p>
@@ -6488,7 +6544,7 @@
           <a:p>
             <a:fld id="{76969C88-B244-455D-A017-012B25B1ACDD}" type="datetimeFigureOut">
               <a:rPr lang="en-US" smtClean="0"/>
-              <a:t>8/4/2023</a:t>
+              <a:t>8/8/2023</a:t>
             </a:fld>
             <a:endParaRPr lang="en-US"/>
           </a:p>
@@ -6658,7 +6714,7 @@
           <a:p>
             <a:fld id="{76969C88-B244-455D-A017-012B25B1ACDD}" type="datetimeFigureOut">
               <a:rPr lang="en-US" smtClean="0"/>
-              <a:t>8/4/2023</a:t>
+              <a:t>8/8/2023</a:t>
             </a:fld>
             <a:endParaRPr lang="en-US"/>
           </a:p>
@@ -6902,7 +6958,7 @@
           <a:p>
             <a:fld id="{76969C88-B244-455D-A017-012B25B1ACDD}" type="datetimeFigureOut">
               <a:rPr lang="en-US" smtClean="0"/>
-              <a:t>8/4/2023</a:t>
+              <a:t>8/8/2023</a:t>
             </a:fld>
             <a:endParaRPr lang="en-US"/>
           </a:p>
@@ -7138,7 +7194,7 @@
           <a:p>
             <a:fld id="{76969C88-B244-455D-A017-012B25B1ACDD}" type="datetimeFigureOut">
               <a:rPr lang="en-US" smtClean="0"/>
-              <a:t>8/4/2023</a:t>
+              <a:t>8/8/2023</a:t>
             </a:fld>
             <a:endParaRPr lang="en-US"/>
           </a:p>
@@ -7604,7 +7660,7 @@
           <a:p>
             <a:fld id="{76969C88-B244-455D-A017-012B25B1ACDD}" type="datetimeFigureOut">
               <a:rPr lang="en-US" smtClean="0"/>
-              <a:t>8/4/2023</a:t>
+              <a:t>8/8/2023</a:t>
             </a:fld>
             <a:endParaRPr lang="en-US"/>
           </a:p>
@@ -7722,7 +7778,7 @@
           <a:p>
             <a:fld id="{76969C88-B244-455D-A017-012B25B1ACDD}" type="datetimeFigureOut">
               <a:rPr lang="en-US" smtClean="0"/>
-              <a:t>8/4/2023</a:t>
+              <a:t>8/8/2023</a:t>
             </a:fld>
             <a:endParaRPr lang="en-US"/>
           </a:p>
@@ -7817,7 +7873,7 @@
           <a:p>
             <a:fld id="{76969C88-B244-455D-A017-012B25B1ACDD}" type="datetimeFigureOut">
               <a:rPr lang="en-US" smtClean="0"/>
-              <a:t>8/4/2023</a:t>
+              <a:t>8/8/2023</a:t>
             </a:fld>
             <a:endParaRPr lang="en-US"/>
           </a:p>
@@ -8072,7 +8128,7 @@
           <a:p>
             <a:fld id="{76969C88-B244-455D-A017-012B25B1ACDD}" type="datetimeFigureOut">
               <a:rPr lang="en-US" smtClean="0"/>
-              <a:t>8/4/2023</a:t>
+              <a:t>8/8/2023</a:t>
             </a:fld>
             <a:endParaRPr lang="en-US"/>
           </a:p>
@@ -8372,7 +8428,7 @@
           <a:p>
             <a:fld id="{76969C88-B244-455D-A017-012B25B1ACDD}" type="datetimeFigureOut">
               <a:rPr lang="en-US" smtClean="0"/>
-              <a:t>8/4/2023</a:t>
+              <a:t>8/8/2023</a:t>
             </a:fld>
             <a:endParaRPr lang="en-US"/>
           </a:p>
@@ -8607,7 +8663,7 @@
             <a:fld id="{76969C88-B244-455D-A017-012B25B1ACDD}" type="datetimeFigureOut">
               <a:rPr lang="en-US" smtClean="0"/>
               <a:pPr/>
-              <a:t>8/4/2023</a:t>
+              <a:t>8/8/2023</a:t>
             </a:fld>
             <a:endParaRPr lang="en-US"/>
           </a:p>
@@ -9417,6 +9473,133 @@
 </p:sld>
 </file>
 
+<file path=ppt/slides/slide10.xml><?xml version="1.0" encoding="utf-8"?>
+<p:sld xmlns:a="http://schemas.openxmlformats.org/drawingml/2006/main" xmlns:r="http://schemas.openxmlformats.org/officeDocument/2006/relationships" xmlns:p="http://schemas.openxmlformats.org/presentationml/2006/main">
+  <p:cSld>
+    <p:spTree>
+      <p:nvGrpSpPr>
+        <p:cNvPr id="1" name=""/>
+        <p:cNvGrpSpPr/>
+        <p:nvPr/>
+      </p:nvGrpSpPr>
+      <p:grpSpPr>
+        <a:xfrm>
+          <a:off x="0" y="0"/>
+          <a:ext cx="0" cy="0"/>
+          <a:chOff x="0" y="0"/>
+          <a:chExt cx="0" cy="0"/>
+        </a:xfrm>
+      </p:grpSpPr>
+      <p:sp>
+        <p:nvSpPr>
+          <p:cNvPr id="2" name="Title 1">
+            <a:extLst>
+              <a:ext uri="{FF2B5EF4-FFF2-40B4-BE49-F238E27FC236}">
+                <a16:creationId xmlns:a16="http://schemas.microsoft.com/office/drawing/2014/main" id="{3930745E-F976-C7E3-6A12-11E468612180}"/>
+              </a:ext>
+            </a:extLst>
+          </p:cNvPr>
+          <p:cNvSpPr>
+            <a:spLocks noGrp="1"/>
+          </p:cNvSpPr>
+          <p:nvPr>
+            <p:ph type="title"/>
+          </p:nvPr>
+        </p:nvSpPr>
+        <p:spPr/>
+        <p:txBody>
+          <a:bodyPr/>
+          <a:lstStyle/>
+          <a:p>
+            <a:r>
+              <a:rPr lang="en-GB" dirty="0"/>
+              <a:t>Summary</a:t>
+            </a:r>
+            <a:endParaRPr lang="en-IE" dirty="0"/>
+          </a:p>
+        </p:txBody>
+      </p:sp>
+      <p:sp>
+        <p:nvSpPr>
+          <p:cNvPr id="3" name="Content Placeholder 2">
+            <a:extLst>
+              <a:ext uri="{FF2B5EF4-FFF2-40B4-BE49-F238E27FC236}">
+                <a16:creationId xmlns:a16="http://schemas.microsoft.com/office/drawing/2014/main" id="{4D226A41-1D86-96D1-DF1E-1CC5032F2C36}"/>
+              </a:ext>
+            </a:extLst>
+          </p:cNvPr>
+          <p:cNvSpPr>
+            <a:spLocks noGrp="1"/>
+          </p:cNvSpPr>
+          <p:nvPr>
+            <p:ph idx="1"/>
+          </p:nvPr>
+        </p:nvSpPr>
+        <p:spPr/>
+        <p:txBody>
+          <a:bodyPr/>
+          <a:lstStyle/>
+          <a:p>
+            <a:r>
+              <a:rPr lang="en-GB" dirty="0"/>
+              <a:t>This lesson covered</a:t>
+            </a:r>
+          </a:p>
+          <a:p>
+            <a:pPr lvl="1"/>
+            <a:r>
+              <a:rPr lang="en-GB" dirty="0"/>
+              <a:t>Characters</a:t>
+            </a:r>
+          </a:p>
+          <a:p>
+            <a:pPr lvl="1"/>
+            <a:r>
+              <a:rPr lang="en-GB" dirty="0"/>
+              <a:t>Strings</a:t>
+            </a:r>
+          </a:p>
+          <a:p>
+            <a:pPr lvl="1"/>
+            <a:r>
+              <a:rPr lang="en-GB" dirty="0"/>
+              <a:t>Functions</a:t>
+            </a:r>
+          </a:p>
+          <a:p>
+            <a:pPr lvl="1"/>
+            <a:r>
+              <a:rPr lang="en-GB" dirty="0"/>
+              <a:t>How to use the print function</a:t>
+            </a:r>
+          </a:p>
+          <a:p>
+            <a:pPr lvl="1"/>
+            <a:r>
+              <a:rPr lang="en-GB" dirty="0"/>
+              <a:t>Some </a:t>
+            </a:r>
+            <a:r>
+              <a:rPr lang="en-GB"/>
+              <a:t>special characters</a:t>
+            </a:r>
+            <a:endParaRPr lang="en-IE"/>
+          </a:p>
+        </p:txBody>
+      </p:sp>
+    </p:spTree>
+    <p:extLst>
+      <p:ext uri="{BB962C8B-B14F-4D97-AF65-F5344CB8AC3E}">
+        <p14:creationId xmlns:p14="http://schemas.microsoft.com/office/powerpoint/2010/main" val="1386672185"/>
+      </p:ext>
+    </p:extLst>
+  </p:cSld>
+  <p:clrMapOvr>
+    <a:masterClrMapping/>
+  </p:clrMapOvr>
+</p:sld>
+</file>
+
 <file path=ppt/slides/slide2.xml><?xml version="1.0" encoding="utf-8"?>
 <p:sld xmlns:a="http://schemas.openxmlformats.org/drawingml/2006/main" xmlns:r="http://schemas.openxmlformats.org/officeDocument/2006/relationships" xmlns:p="http://schemas.openxmlformats.org/presentationml/2006/main">
   <p:cSld>
@@ -10990,7 +11173,11 @@
           <a:bodyPr/>
           <a:lstStyle/>
           <a:p>
-            <a:endParaRPr lang="en-IE"/>
+            <a:r>
+              <a:rPr lang="en-GB" dirty="0"/>
+              <a:t>Using Tabs to Create Spaces</a:t>
+            </a:r>
+            <a:endParaRPr lang="en-IE" dirty="0"/>
           </a:p>
         </p:txBody>
       </p:sp>
@@ -11015,7 +11202,43 @@
           <a:bodyPr/>
           <a:lstStyle/>
           <a:p>
-            <a:endParaRPr lang="en-IE"/>
+            <a:r>
+              <a:rPr lang="en-GB" dirty="0"/>
+              <a:t>Print the following Using the print command</a:t>
+            </a:r>
+          </a:p>
+          <a:p>
+            <a:r>
+              <a:rPr lang="en-GB" dirty="0"/>
+              <a:t>*	There are Spaces on the Screen	*</a:t>
+            </a:r>
+          </a:p>
+          <a:p>
+            <a:r>
+              <a:rPr lang="en-GB" dirty="0"/>
+              <a:t>You can use \t to add in a tab space which is the same as 3-5 spaces</a:t>
+            </a:r>
+          </a:p>
+          <a:p>
+            <a:r>
+              <a:rPr lang="en-GB" dirty="0"/>
+              <a:t>Use the following command</a:t>
+            </a:r>
+          </a:p>
+          <a:p>
+            <a:r>
+              <a:rPr lang="en-GB" dirty="0"/>
+              <a:t>print(“*\</a:t>
+            </a:r>
+            <a:r>
+              <a:rPr lang="en-GB" dirty="0" err="1"/>
+              <a:t>tThere</a:t>
+            </a:r>
+            <a:r>
+              <a:rPr lang="en-GB" dirty="0"/>
+              <a:t> are Spaces on the Screen\t*”)</a:t>
+            </a:r>
+            <a:endParaRPr lang="en-IE" dirty="0"/>
           </a:p>
         </p:txBody>
       </p:sp>

</xml_diff>